<commit_message>
Added statements documentation for P
</commit_message>
<xml_diff>
--- a/Docs/images/images.pptx
+++ b/Docs/images/images.pptx
@@ -197,7 +197,7 @@
           <a:p>
             <a:fld id="{C4E88698-B1F6-4A0B-A6AC-51F29AD54C81}" type="datetimeFigureOut">
               <a:rPr lang="en-US" smtClean="0"/>
-              <a:t>6/30/21</a:t>
+              <a:t>7/1/21</a:t>
             </a:fld>
             <a:endParaRPr lang="en-US"/>
           </a:p>
@@ -593,7 +593,7 @@
           <a:p>
             <a:fld id="{E0EBF19A-D346-42F3-8BF4-7687FD327241}" type="datetimeFigureOut">
               <a:rPr lang="en-US" smtClean="0"/>
-              <a:t>6/30/21</a:t>
+              <a:t>7/1/21</a:t>
             </a:fld>
             <a:endParaRPr lang="en-US"/>
           </a:p>
@@ -761,7 +761,7 @@
           <a:p>
             <a:fld id="{E0EBF19A-D346-42F3-8BF4-7687FD327241}" type="datetimeFigureOut">
               <a:rPr lang="en-US" smtClean="0"/>
-              <a:t>6/30/21</a:t>
+              <a:t>7/1/21</a:t>
             </a:fld>
             <a:endParaRPr lang="en-US"/>
           </a:p>
@@ -939,7 +939,7 @@
           <a:p>
             <a:fld id="{E0EBF19A-D346-42F3-8BF4-7687FD327241}" type="datetimeFigureOut">
               <a:rPr lang="en-US" smtClean="0"/>
-              <a:t>6/30/21</a:t>
+              <a:t>7/1/21</a:t>
             </a:fld>
             <a:endParaRPr lang="en-US"/>
           </a:p>
@@ -1107,7 +1107,7 @@
           <a:p>
             <a:fld id="{E0EBF19A-D346-42F3-8BF4-7687FD327241}" type="datetimeFigureOut">
               <a:rPr lang="en-US" smtClean="0"/>
-              <a:t>6/30/21</a:t>
+              <a:t>7/1/21</a:t>
             </a:fld>
             <a:endParaRPr lang="en-US"/>
           </a:p>
@@ -1352,7 +1352,7 @@
           <a:p>
             <a:fld id="{E0EBF19A-D346-42F3-8BF4-7687FD327241}" type="datetimeFigureOut">
               <a:rPr lang="en-US" smtClean="0"/>
-              <a:t>6/30/21</a:t>
+              <a:t>7/1/21</a:t>
             </a:fld>
             <a:endParaRPr lang="en-US"/>
           </a:p>
@@ -1581,7 +1581,7 @@
           <a:p>
             <a:fld id="{E0EBF19A-D346-42F3-8BF4-7687FD327241}" type="datetimeFigureOut">
               <a:rPr lang="en-US" smtClean="0"/>
-              <a:t>6/30/21</a:t>
+              <a:t>7/1/21</a:t>
             </a:fld>
             <a:endParaRPr lang="en-US"/>
           </a:p>
@@ -1945,7 +1945,7 @@
           <a:p>
             <a:fld id="{E0EBF19A-D346-42F3-8BF4-7687FD327241}" type="datetimeFigureOut">
               <a:rPr lang="en-US" smtClean="0"/>
-              <a:t>6/30/21</a:t>
+              <a:t>7/1/21</a:t>
             </a:fld>
             <a:endParaRPr lang="en-US"/>
           </a:p>
@@ -2062,7 +2062,7 @@
           <a:p>
             <a:fld id="{E0EBF19A-D346-42F3-8BF4-7687FD327241}" type="datetimeFigureOut">
               <a:rPr lang="en-US" smtClean="0"/>
-              <a:t>6/30/21</a:t>
+              <a:t>7/1/21</a:t>
             </a:fld>
             <a:endParaRPr lang="en-US"/>
           </a:p>
@@ -2157,7 +2157,7 @@
           <a:p>
             <a:fld id="{E0EBF19A-D346-42F3-8BF4-7687FD327241}" type="datetimeFigureOut">
               <a:rPr lang="en-US" smtClean="0"/>
-              <a:t>6/30/21</a:t>
+              <a:t>7/1/21</a:t>
             </a:fld>
             <a:endParaRPr lang="en-US"/>
           </a:p>
@@ -2432,7 +2432,7 @@
           <a:p>
             <a:fld id="{E0EBF19A-D346-42F3-8BF4-7687FD327241}" type="datetimeFigureOut">
               <a:rPr lang="en-US" smtClean="0"/>
-              <a:t>6/30/21</a:t>
+              <a:t>7/1/21</a:t>
             </a:fld>
             <a:endParaRPr lang="en-US"/>
           </a:p>
@@ -2684,7 +2684,7 @@
           <a:p>
             <a:fld id="{E0EBF19A-D346-42F3-8BF4-7687FD327241}" type="datetimeFigureOut">
               <a:rPr lang="en-US" smtClean="0"/>
-              <a:t>6/30/21</a:t>
+              <a:t>7/1/21</a:t>
             </a:fld>
             <a:endParaRPr lang="en-US"/>
           </a:p>
@@ -2895,7 +2895,7 @@
           <a:p>
             <a:fld id="{E0EBF19A-D346-42F3-8BF4-7687FD327241}" type="datetimeFigureOut">
               <a:rPr lang="en-US" smtClean="0"/>
-              <a:t>6/30/21</a:t>
+              <a:t>7/1/21</a:t>
             </a:fld>
             <a:endParaRPr lang="en-US"/>
           </a:p>
@@ -3300,1387 +3300,1327 @@
           <a:chExt cx="0" cy="0"/>
         </a:xfrm>
       </p:grpSpPr>
-      <p:grpSp>
-        <p:nvGrpSpPr>
-          <p:cNvPr id="3" name="Group 2">
+      <p:sp>
+        <p:nvSpPr>
+          <p:cNvPr id="35" name="Rounded Rectangle 34"/>
+          <p:cNvSpPr/>
+          <p:nvPr/>
+        </p:nvSpPr>
+        <p:spPr>
+          <a:xfrm>
+            <a:off x="1813076" y="1934954"/>
+            <a:ext cx="2104961" cy="2417945"/>
+          </a:xfrm>
+          <a:prstGeom prst="roundRect">
+            <a:avLst/>
+          </a:prstGeom>
+          <a:solidFill>
+            <a:schemeClr val="accent1">
+              <a:lumMod val="40000"/>
+              <a:lumOff val="60000"/>
+            </a:schemeClr>
+          </a:solidFill>
+        </p:spPr>
+        <p:style>
+          <a:lnRef idx="2">
+            <a:schemeClr val="accent1">
+              <a:shade val="50000"/>
+            </a:schemeClr>
+          </a:lnRef>
+          <a:fillRef idx="1">
+            <a:schemeClr val="accent1"/>
+          </a:fillRef>
+          <a:effectRef idx="0">
+            <a:schemeClr val="accent1"/>
+          </a:effectRef>
+          <a:fontRef idx="minor">
+            <a:schemeClr val="lt1"/>
+          </a:fontRef>
+        </p:style>
+        <p:txBody>
+          <a:bodyPr rtlCol="0" anchor="ctr"/>
+          <a:lstStyle/>
+          <a:p>
+            <a:pPr algn="ctr"/>
+            <a:endParaRPr lang="en-US"/>
+          </a:p>
+        </p:txBody>
+      </p:sp>
+      <p:sp>
+        <p:nvSpPr>
+          <p:cNvPr id="36" name="Rectangle 35"/>
+          <p:cNvSpPr/>
+          <p:nvPr/>
+        </p:nvSpPr>
+        <p:spPr>
+          <a:xfrm>
+            <a:off x="2003321" y="2125201"/>
+            <a:ext cx="1693788" cy="349804"/>
+          </a:xfrm>
+          <a:prstGeom prst="rect">
+            <a:avLst/>
+          </a:prstGeom>
+        </p:spPr>
+        <p:style>
+          <a:lnRef idx="2">
+            <a:schemeClr val="dk1"/>
+          </a:lnRef>
+          <a:fillRef idx="1">
+            <a:schemeClr val="lt1"/>
+          </a:fillRef>
+          <a:effectRef idx="0">
+            <a:schemeClr val="dk1"/>
+          </a:effectRef>
+          <a:fontRef idx="minor">
+            <a:schemeClr val="dk1"/>
+          </a:fontRef>
+        </p:style>
+        <p:txBody>
+          <a:bodyPr rtlCol="0" anchor="ctr"/>
+          <a:lstStyle/>
+          <a:p>
+            <a:pPr algn="ctr"/>
+            <a:r>
+              <a:rPr lang="en-US" dirty="0"/>
+              <a:t>Implementation</a:t>
+            </a:r>
+          </a:p>
+        </p:txBody>
+      </p:sp>
+      <p:sp>
+        <p:nvSpPr>
+          <p:cNvPr id="38" name="Rectangle 37"/>
+          <p:cNvSpPr/>
+          <p:nvPr/>
+        </p:nvSpPr>
+        <p:spPr>
+          <a:xfrm>
+            <a:off x="2018662" y="2665252"/>
+            <a:ext cx="1693788" cy="349804"/>
+          </a:xfrm>
+          <a:prstGeom prst="rect">
+            <a:avLst/>
+          </a:prstGeom>
+        </p:spPr>
+        <p:style>
+          <a:lnRef idx="2">
+            <a:schemeClr val="dk1"/>
+          </a:lnRef>
+          <a:fillRef idx="1">
+            <a:schemeClr val="lt1"/>
+          </a:fillRef>
+          <a:effectRef idx="0">
+            <a:schemeClr val="dk1"/>
+          </a:effectRef>
+          <a:fontRef idx="minor">
+            <a:schemeClr val="dk1"/>
+          </a:fontRef>
+        </p:style>
+        <p:txBody>
+          <a:bodyPr rtlCol="0" anchor="ctr"/>
+          <a:lstStyle/>
+          <a:p>
+            <a:pPr algn="ctr"/>
+            <a:r>
+              <a:rPr lang="en-US" dirty="0"/>
+              <a:t>Specifications</a:t>
+            </a:r>
+          </a:p>
+        </p:txBody>
+      </p:sp>
+      <p:sp>
+        <p:nvSpPr>
+          <p:cNvPr id="39" name="Rectangle 38"/>
+          <p:cNvSpPr/>
+          <p:nvPr/>
+        </p:nvSpPr>
+        <p:spPr>
+          <a:xfrm>
+            <a:off x="2018662" y="3205303"/>
+            <a:ext cx="1693788" cy="349804"/>
+          </a:xfrm>
+          <a:prstGeom prst="rect">
+            <a:avLst/>
+          </a:prstGeom>
+        </p:spPr>
+        <p:style>
+          <a:lnRef idx="2">
+            <a:schemeClr val="dk1"/>
+          </a:lnRef>
+          <a:fillRef idx="1">
+            <a:schemeClr val="lt1"/>
+          </a:fillRef>
+          <a:effectRef idx="0">
+            <a:schemeClr val="dk1"/>
+          </a:effectRef>
+          <a:fontRef idx="minor">
+            <a:schemeClr val="dk1"/>
+          </a:fontRef>
+        </p:style>
+        <p:txBody>
+          <a:bodyPr rtlCol="0" anchor="ctr"/>
+          <a:lstStyle/>
+          <a:p>
+            <a:pPr algn="ctr"/>
+            <a:r>
+              <a:rPr lang="en-US" dirty="0"/>
+              <a:t>Abstractions</a:t>
+            </a:r>
+          </a:p>
+        </p:txBody>
+      </p:sp>
+      <p:sp>
+        <p:nvSpPr>
+          <p:cNvPr id="40" name="Rectangle 39"/>
+          <p:cNvSpPr/>
+          <p:nvPr/>
+        </p:nvSpPr>
+        <p:spPr>
+          <a:xfrm>
+            <a:off x="2018662" y="3782182"/>
+            <a:ext cx="1693788" cy="349804"/>
+          </a:xfrm>
+          <a:prstGeom prst="rect">
+            <a:avLst/>
+          </a:prstGeom>
+        </p:spPr>
+        <p:style>
+          <a:lnRef idx="2">
+            <a:schemeClr val="dk1"/>
+          </a:lnRef>
+          <a:fillRef idx="1">
+            <a:schemeClr val="lt1"/>
+          </a:fillRef>
+          <a:effectRef idx="0">
+            <a:schemeClr val="dk1"/>
+          </a:effectRef>
+          <a:fontRef idx="minor">
+            <a:schemeClr val="dk1"/>
+          </a:fontRef>
+        </p:style>
+        <p:txBody>
+          <a:bodyPr rtlCol="0" anchor="ctr"/>
+          <a:lstStyle/>
+          <a:p>
+            <a:pPr algn="ctr"/>
+            <a:r>
+              <a:rPr lang="en-US" dirty="0"/>
+              <a:t>Tests</a:t>
+            </a:r>
+          </a:p>
+        </p:txBody>
+      </p:sp>
+      <p:sp>
+        <p:nvSpPr>
+          <p:cNvPr id="41" name="TextBox 40"/>
+          <p:cNvSpPr txBox="1"/>
+          <p:nvPr/>
+        </p:nvSpPr>
+        <p:spPr>
+          <a:xfrm>
+            <a:off x="2234486" y="1481296"/>
+            <a:ext cx="1262140" cy="400110"/>
+          </a:xfrm>
+          <a:prstGeom prst="rect">
+            <a:avLst/>
+          </a:prstGeom>
+          <a:noFill/>
+        </p:spPr>
+        <p:txBody>
+          <a:bodyPr wrap="none" rtlCol="0">
+            <a:spAutoFit/>
+          </a:bodyPr>
+          <a:lstStyle/>
+          <a:p>
+            <a:r>
+              <a:rPr lang="en-US" sz="2000" dirty="0">
+                <a:solidFill>
+                  <a:srgbClr val="00B0F0"/>
+                </a:solidFill>
+              </a:rPr>
+              <a:t>P</a:t>
+            </a:r>
+            <a:r>
+              <a:rPr lang="en-US" sz="2000" dirty="0"/>
+              <a:t> Program</a:t>
+            </a:r>
+          </a:p>
+        </p:txBody>
+      </p:sp>
+      <p:cxnSp>
+        <p:nvCxnSpPr>
+          <p:cNvPr id="43" name="Straight Arrow Connector 42"/>
+          <p:cNvCxnSpPr>
+            <a:stCxn id="35" idx="3"/>
+            <a:endCxn id="45" idx="2"/>
+          </p:cNvCxnSpPr>
+          <p:nvPr/>
+        </p:nvCxnSpPr>
+        <p:spPr>
+          <a:xfrm flipV="1">
+            <a:off x="3918037" y="3143926"/>
+            <a:ext cx="1098509" cy="1"/>
+          </a:xfrm>
+          <a:prstGeom prst="straightConnector1">
+            <a:avLst/>
+          </a:prstGeom>
+          <a:ln w="57150">
+            <a:tailEnd type="triangle"/>
+          </a:ln>
+        </p:spPr>
+        <p:style>
+          <a:lnRef idx="3">
+            <a:schemeClr val="accent1"/>
+          </a:lnRef>
+          <a:fillRef idx="0">
+            <a:schemeClr val="accent1"/>
+          </a:fillRef>
+          <a:effectRef idx="2">
+            <a:schemeClr val="accent1"/>
+          </a:effectRef>
+          <a:fontRef idx="minor">
+            <a:schemeClr val="tx1"/>
+          </a:fontRef>
+        </p:style>
+      </p:cxnSp>
+      <p:sp>
+        <p:nvSpPr>
+          <p:cNvPr id="45" name="Oval 44"/>
+          <p:cNvSpPr/>
+          <p:nvPr/>
+        </p:nvSpPr>
+        <p:spPr>
+          <a:xfrm>
+            <a:off x="5016546" y="2531768"/>
+            <a:ext cx="1564913" cy="1224316"/>
+          </a:xfrm>
+          <a:prstGeom prst="ellipse">
+            <a:avLst/>
+          </a:prstGeom>
+        </p:spPr>
+        <p:style>
+          <a:lnRef idx="1">
+            <a:schemeClr val="accent1"/>
+          </a:lnRef>
+          <a:fillRef idx="2">
+            <a:schemeClr val="accent1"/>
+          </a:fillRef>
+          <a:effectRef idx="1">
+            <a:schemeClr val="accent1"/>
+          </a:effectRef>
+          <a:fontRef idx="minor">
+            <a:schemeClr val="dk1"/>
+          </a:fontRef>
+        </p:style>
+        <p:txBody>
+          <a:bodyPr rtlCol="0" anchor="ctr"/>
+          <a:lstStyle/>
+          <a:p>
+            <a:pPr algn="ctr"/>
+            <a:r>
+              <a:rPr lang="en-US" dirty="0"/>
+              <a:t>Compiler</a:t>
+            </a:r>
+          </a:p>
+          <a:p>
+            <a:pPr algn="ctr"/>
+            <a:r>
+              <a:rPr lang="en-US" dirty="0"/>
+              <a:t>Toolchain</a:t>
+            </a:r>
+          </a:p>
+        </p:txBody>
+      </p:sp>
+      <p:sp>
+        <p:nvSpPr>
+          <p:cNvPr id="2" name="Rounded Rectangle 1"/>
+          <p:cNvSpPr/>
+          <p:nvPr/>
+        </p:nvSpPr>
+        <p:spPr>
+          <a:xfrm>
+            <a:off x="5042627" y="4159712"/>
+            <a:ext cx="1512749" cy="632654"/>
+          </a:xfrm>
+          <a:prstGeom prst="roundRect">
+            <a:avLst/>
+          </a:prstGeom>
+        </p:spPr>
+        <p:style>
+          <a:lnRef idx="1">
+            <a:schemeClr val="accent3"/>
+          </a:lnRef>
+          <a:fillRef idx="2">
+            <a:schemeClr val="accent3"/>
+          </a:fillRef>
+          <a:effectRef idx="1">
+            <a:schemeClr val="accent3"/>
+          </a:effectRef>
+          <a:fontRef idx="minor">
+            <a:schemeClr val="dk1"/>
+          </a:fontRef>
+        </p:style>
+        <p:txBody>
+          <a:bodyPr rtlCol="0" anchor="ctr"/>
+          <a:lstStyle/>
+          <a:p>
+            <a:pPr algn="ctr"/>
+            <a:r>
+              <a:rPr lang="en-US" dirty="0"/>
+              <a:t>Intermediate Code</a:t>
+            </a:r>
+          </a:p>
+        </p:txBody>
+      </p:sp>
+      <p:cxnSp>
+        <p:nvCxnSpPr>
+          <p:cNvPr id="12" name="Straight Arrow Connector 11"/>
+          <p:cNvCxnSpPr>
+            <a:cxnSpLocks/>
+            <a:stCxn id="45" idx="4"/>
+            <a:endCxn id="2" idx="0"/>
+          </p:cNvCxnSpPr>
+          <p:nvPr/>
+        </p:nvCxnSpPr>
+        <p:spPr>
+          <a:xfrm flipH="1">
+            <a:off x="5799002" y="3756084"/>
+            <a:ext cx="1" cy="403628"/>
+          </a:xfrm>
+          <a:prstGeom prst="straightConnector1">
+            <a:avLst/>
+          </a:prstGeom>
+          <a:ln w="57150">
+            <a:tailEnd type="triangle"/>
+          </a:ln>
+        </p:spPr>
+        <p:style>
+          <a:lnRef idx="3">
+            <a:schemeClr val="accent1"/>
+          </a:lnRef>
+          <a:fillRef idx="0">
+            <a:schemeClr val="accent1"/>
+          </a:fillRef>
+          <a:effectRef idx="2">
+            <a:schemeClr val="accent1"/>
+          </a:effectRef>
+          <a:fontRef idx="minor">
+            <a:schemeClr val="tx1"/>
+          </a:fontRef>
+        </p:style>
+      </p:cxnSp>
+      <p:sp>
+        <p:nvSpPr>
+          <p:cNvPr id="18" name="Oval 17"/>
+          <p:cNvSpPr/>
+          <p:nvPr/>
+        </p:nvSpPr>
+        <p:spPr>
+          <a:xfrm>
+            <a:off x="7728039" y="3857744"/>
+            <a:ext cx="1682537" cy="1224316"/>
+          </a:xfrm>
+          <a:prstGeom prst="ellipse">
+            <a:avLst/>
+          </a:prstGeom>
+        </p:spPr>
+        <p:style>
+          <a:lnRef idx="1">
+            <a:schemeClr val="accent1"/>
+          </a:lnRef>
+          <a:fillRef idx="2">
+            <a:schemeClr val="accent1"/>
+          </a:fillRef>
+          <a:effectRef idx="1">
+            <a:schemeClr val="accent1"/>
+          </a:effectRef>
+          <a:fontRef idx="minor">
+            <a:schemeClr val="dk1"/>
+          </a:fontRef>
+        </p:style>
+        <p:txBody>
+          <a:bodyPr rtlCol="0" anchor="ctr"/>
+          <a:lstStyle/>
+          <a:p>
+            <a:pPr algn="ctr"/>
+            <a:r>
+              <a:rPr lang="en-US" dirty="0"/>
+              <a:t>P-Analysis-Engine</a:t>
+            </a:r>
+          </a:p>
+        </p:txBody>
+      </p:sp>
+      <p:cxnSp>
+        <p:nvCxnSpPr>
+          <p:cNvPr id="19" name="Straight Arrow Connector 18"/>
+          <p:cNvCxnSpPr>
+            <a:stCxn id="2" idx="3"/>
+            <a:endCxn id="18" idx="2"/>
+          </p:cNvCxnSpPr>
+          <p:nvPr/>
+        </p:nvCxnSpPr>
+        <p:spPr>
+          <a:xfrm flipV="1">
+            <a:off x="6555376" y="4469902"/>
+            <a:ext cx="1172663" cy="6137"/>
+          </a:xfrm>
+          <a:prstGeom prst="straightConnector1">
+            <a:avLst/>
+          </a:prstGeom>
+          <a:ln w="57150">
+            <a:tailEnd type="triangle"/>
+          </a:ln>
+        </p:spPr>
+        <p:style>
+          <a:lnRef idx="3">
+            <a:schemeClr val="accent1"/>
+          </a:lnRef>
+          <a:fillRef idx="0">
+            <a:schemeClr val="accent1"/>
+          </a:fillRef>
+          <a:effectRef idx="2">
+            <a:schemeClr val="accent1"/>
+          </a:effectRef>
+          <a:fontRef idx="minor">
+            <a:schemeClr val="tx1"/>
+          </a:fontRef>
+        </p:style>
+      </p:cxnSp>
+      <p:cxnSp>
+        <p:nvCxnSpPr>
+          <p:cNvPr id="11" name="Elbow Connector 10"/>
+          <p:cNvCxnSpPr>
+            <a:cxnSpLocks/>
+            <a:stCxn id="18" idx="4"/>
+            <a:endCxn id="35" idx="2"/>
+          </p:cNvCxnSpPr>
+          <p:nvPr/>
+        </p:nvCxnSpPr>
+        <p:spPr>
+          <a:xfrm rot="5400000" flipH="1">
+            <a:off x="5352852" y="1865605"/>
+            <a:ext cx="729161" cy="5703751"/>
+          </a:xfrm>
+          <a:prstGeom prst="bentConnector3">
+            <a:avLst>
+              <a:gd name="adj1" fmla="val -31351"/>
+            </a:avLst>
+          </a:prstGeom>
+          <a:ln w="57150">
+            <a:solidFill>
+              <a:srgbClr val="FF0000"/>
+            </a:solidFill>
+            <a:tailEnd type="triangle"/>
+          </a:ln>
+        </p:spPr>
+        <p:style>
+          <a:lnRef idx="3">
+            <a:schemeClr val="accent1"/>
+          </a:lnRef>
+          <a:fillRef idx="0">
+            <a:schemeClr val="accent1"/>
+          </a:fillRef>
+          <a:effectRef idx="2">
+            <a:schemeClr val="accent1"/>
+          </a:effectRef>
+          <a:fontRef idx="minor">
+            <a:schemeClr val="tx1"/>
+          </a:fontRef>
+        </p:style>
+      </p:cxnSp>
+      <p:sp>
+        <p:nvSpPr>
+          <p:cNvPr id="13" name="TextBox 12"/>
+          <p:cNvSpPr txBox="1"/>
+          <p:nvPr/>
+        </p:nvSpPr>
+        <p:spPr>
+          <a:xfrm>
+            <a:off x="4549331" y="5118309"/>
+            <a:ext cx="2499339" cy="338554"/>
+          </a:xfrm>
+          <a:prstGeom prst="rect">
+            <a:avLst/>
+          </a:prstGeom>
+          <a:solidFill>
+            <a:schemeClr val="bg1"/>
+          </a:solidFill>
+          <a:ln>
+            <a:solidFill>
+              <a:schemeClr val="bg1"/>
+            </a:solidFill>
+          </a:ln>
+        </p:spPr>
+        <p:txBody>
+          <a:bodyPr wrap="square" rtlCol="0">
+            <a:spAutoFit/>
+          </a:bodyPr>
+          <a:lstStyle/>
+          <a:p>
+            <a:pPr algn="ctr"/>
+            <a:r>
+              <a:rPr lang="en-US" sz="1600" dirty="0"/>
+              <a:t>Reproducible Error Trace</a:t>
+            </a:r>
+          </a:p>
+        </p:txBody>
+      </p:sp>
+      <p:sp>
+        <p:nvSpPr>
+          <p:cNvPr id="25" name="Rounded Rectangle 24"/>
+          <p:cNvSpPr/>
+          <p:nvPr/>
+        </p:nvSpPr>
+        <p:spPr>
+          <a:xfrm>
+            <a:off x="4761096" y="639002"/>
+            <a:ext cx="2066603" cy="1384873"/>
+          </a:xfrm>
+          <a:prstGeom prst="roundRect">
+            <a:avLst/>
+          </a:prstGeom>
+        </p:spPr>
+        <p:style>
+          <a:lnRef idx="1">
+            <a:schemeClr val="accent3"/>
+          </a:lnRef>
+          <a:fillRef idx="2">
+            <a:schemeClr val="accent3"/>
+          </a:fillRef>
+          <a:effectRef idx="1">
+            <a:schemeClr val="accent3"/>
+          </a:effectRef>
+          <a:fontRef idx="minor">
+            <a:schemeClr val="dk1"/>
+          </a:fontRef>
+        </p:style>
+        <p:txBody>
+          <a:bodyPr rtlCol="0" anchor="ctr"/>
+          <a:lstStyle/>
+          <a:p>
+            <a:pPr algn="ctr"/>
+            <a:endParaRPr lang="en-US" dirty="0"/>
+          </a:p>
+        </p:txBody>
+      </p:sp>
+      <p:sp>
+        <p:nvSpPr>
+          <p:cNvPr id="14" name="Rounded Rectangle 13"/>
+          <p:cNvSpPr/>
+          <p:nvPr/>
+        </p:nvSpPr>
+        <p:spPr>
+          <a:xfrm>
+            <a:off x="5226478" y="1420824"/>
+            <a:ext cx="1166013" cy="460582"/>
+          </a:xfrm>
+          <a:prstGeom prst="roundRect">
+            <a:avLst/>
+          </a:prstGeom>
+          <a:ln w="19050">
+            <a:prstDash val="sysDash"/>
+          </a:ln>
+        </p:spPr>
+        <p:style>
+          <a:lnRef idx="2">
+            <a:schemeClr val="dk1"/>
+          </a:lnRef>
+          <a:fillRef idx="1">
+            <a:schemeClr val="lt1"/>
+          </a:fillRef>
+          <a:effectRef idx="0">
+            <a:schemeClr val="dk1"/>
+          </a:effectRef>
+          <a:fontRef idx="minor">
+            <a:schemeClr val="dk1"/>
+          </a:fontRef>
+        </p:style>
+        <p:txBody>
+          <a:bodyPr rtlCol="0" anchor="ctr"/>
+          <a:lstStyle/>
+          <a:p>
+            <a:pPr algn="ctr"/>
+            <a:r>
+              <a:rPr lang="en-US" dirty="0"/>
+              <a:t>Wrapper</a:t>
+            </a:r>
+          </a:p>
+        </p:txBody>
+      </p:sp>
+      <p:sp>
+        <p:nvSpPr>
+          <p:cNvPr id="27" name="Rounded Rectangle 26"/>
+          <p:cNvSpPr/>
+          <p:nvPr/>
+        </p:nvSpPr>
+        <p:spPr>
+          <a:xfrm>
+            <a:off x="4869262" y="702471"/>
+            <a:ext cx="1853346" cy="609889"/>
+          </a:xfrm>
+          <a:prstGeom prst="roundRect">
+            <a:avLst/>
+          </a:prstGeom>
+          <a:ln w="19050">
+            <a:prstDash val="sysDash"/>
+          </a:ln>
+        </p:spPr>
+        <p:style>
+          <a:lnRef idx="2">
+            <a:schemeClr val="dk1"/>
+          </a:lnRef>
+          <a:fillRef idx="1">
+            <a:schemeClr val="lt1"/>
+          </a:fillRef>
+          <a:effectRef idx="0">
+            <a:schemeClr val="dk1"/>
+          </a:effectRef>
+          <a:fontRef idx="minor">
+            <a:schemeClr val="dk1"/>
+          </a:fontRef>
+        </p:style>
+        <p:txBody>
+          <a:bodyPr rtlCol="0" anchor="ctr"/>
+          <a:lstStyle/>
+          <a:p>
+            <a:pPr algn="ctr"/>
+            <a:r>
+              <a:rPr lang="en-US" dirty="0" err="1"/>
+              <a:t>Autogen</a:t>
+            </a:r>
+            <a:r>
+              <a:rPr lang="en-US" dirty="0"/>
+              <a:t>. </a:t>
+            </a:r>
+            <a:r>
+              <a:rPr lang="en-US" dirty="0" err="1"/>
+              <a:t>Impl</a:t>
+            </a:r>
+            <a:r>
+              <a:rPr lang="en-US" dirty="0"/>
+              <a:t>.</a:t>
+            </a:r>
+          </a:p>
+          <a:p>
+            <a:pPr algn="ctr"/>
+            <a:r>
+              <a:rPr lang="en-US" dirty="0"/>
+              <a:t>(C/C#/Java)</a:t>
+            </a:r>
+          </a:p>
+        </p:txBody>
+      </p:sp>
+      <p:cxnSp>
+        <p:nvCxnSpPr>
+          <p:cNvPr id="28" name="Straight Arrow Connector 27"/>
+          <p:cNvCxnSpPr>
+            <a:stCxn id="45" idx="0"/>
+            <a:endCxn id="25" idx="2"/>
+          </p:cNvCxnSpPr>
+          <p:nvPr/>
+        </p:nvCxnSpPr>
+        <p:spPr>
+          <a:xfrm flipH="1" flipV="1">
+            <a:off x="5794398" y="2023875"/>
+            <a:ext cx="4605" cy="507893"/>
+          </a:xfrm>
+          <a:prstGeom prst="straightConnector1">
+            <a:avLst/>
+          </a:prstGeom>
+          <a:ln w="57150">
+            <a:tailEnd type="triangle"/>
+          </a:ln>
+        </p:spPr>
+        <p:style>
+          <a:lnRef idx="3">
+            <a:schemeClr val="accent1"/>
+          </a:lnRef>
+          <a:fillRef idx="0">
+            <a:schemeClr val="accent1"/>
+          </a:fillRef>
+          <a:effectRef idx="2">
+            <a:schemeClr val="accent1"/>
+          </a:effectRef>
+          <a:fontRef idx="minor">
+            <a:schemeClr val="tx1"/>
+          </a:fontRef>
+        </p:style>
+      </p:cxnSp>
+      <p:sp>
+        <p:nvSpPr>
+          <p:cNvPr id="31" name="Rectangle: Rounded Corners 20"/>
+          <p:cNvSpPr/>
+          <p:nvPr/>
+        </p:nvSpPr>
+        <p:spPr>
+          <a:xfrm>
+            <a:off x="7615528" y="320942"/>
+            <a:ext cx="3616667" cy="2052471"/>
+          </a:xfrm>
+          <a:prstGeom prst="roundRect">
+            <a:avLst/>
+          </a:prstGeom>
+          <a:solidFill>
+            <a:schemeClr val="accent1">
+              <a:lumMod val="40000"/>
+              <a:lumOff val="60000"/>
+            </a:schemeClr>
+          </a:solidFill>
+          <a:ln w="19050">
+            <a:solidFill>
+              <a:schemeClr val="tx1"/>
+            </a:solidFill>
+            <a:prstDash val="lgDash"/>
+          </a:ln>
+        </p:spPr>
+        <p:style>
+          <a:lnRef idx="1">
+            <a:schemeClr val="accent5"/>
+          </a:lnRef>
+          <a:fillRef idx="2">
+            <a:schemeClr val="accent5"/>
+          </a:fillRef>
+          <a:effectRef idx="1">
+            <a:schemeClr val="accent5"/>
+          </a:effectRef>
+          <a:fontRef idx="minor">
+            <a:schemeClr val="dk1"/>
+          </a:fontRef>
+        </p:style>
+        <p:txBody>
+          <a:bodyPr rtlCol="0" anchor="ctr"/>
+          <a:lstStyle/>
+          <a:p>
+            <a:pPr algn="ctr"/>
+            <a:endParaRPr lang="en-US" dirty="0"/>
+          </a:p>
+        </p:txBody>
+      </p:sp>
+      <p:sp>
+        <p:nvSpPr>
+          <p:cNvPr id="34" name="Rectangle: Rounded Corners 23"/>
+          <p:cNvSpPr/>
+          <p:nvPr/>
+        </p:nvSpPr>
+        <p:spPr>
+          <a:xfrm>
+            <a:off x="9731224" y="438734"/>
+            <a:ext cx="1373138" cy="732504"/>
+          </a:xfrm>
+          <a:prstGeom prst="roundRect">
+            <a:avLst/>
+          </a:prstGeom>
+          <a:solidFill>
+            <a:schemeClr val="bg1"/>
+          </a:solidFill>
+          <a:ln>
+            <a:solidFill>
+              <a:schemeClr val="accent1">
+                <a:lumMod val="75000"/>
+              </a:schemeClr>
+            </a:solidFill>
+          </a:ln>
+        </p:spPr>
+        <p:style>
+          <a:lnRef idx="2">
+            <a:schemeClr val="accent6"/>
+          </a:lnRef>
+          <a:fillRef idx="1">
+            <a:schemeClr val="lt1"/>
+          </a:fillRef>
+          <a:effectRef idx="0">
+            <a:schemeClr val="accent6"/>
+          </a:effectRef>
+          <a:fontRef idx="minor">
+            <a:schemeClr val="dk1"/>
+          </a:fontRef>
+        </p:style>
+        <p:txBody>
+          <a:bodyPr rtlCol="0" anchor="ctr"/>
+          <a:lstStyle/>
+          <a:p>
+            <a:pPr algn="ctr"/>
+            <a:r>
+              <a:rPr lang="en-US" dirty="0">
+                <a:solidFill>
+                  <a:srgbClr val="00B0F0"/>
+                </a:solidFill>
+              </a:rPr>
+              <a:t>P </a:t>
+            </a:r>
+            <a:r>
+              <a:rPr lang="en-US" dirty="0"/>
+              <a:t>Runtime</a:t>
+            </a:r>
+          </a:p>
+          <a:p>
+            <a:pPr algn="ctr"/>
+            <a:r>
+              <a:rPr lang="en-US" dirty="0"/>
+              <a:t>(C/C#/Java)</a:t>
+            </a:r>
+          </a:p>
+        </p:txBody>
+      </p:sp>
+      <p:sp>
+        <p:nvSpPr>
+          <p:cNvPr id="37" name="Rectangle: Rounded Corners 24"/>
+          <p:cNvSpPr/>
+          <p:nvPr/>
+        </p:nvSpPr>
+        <p:spPr>
+          <a:xfrm>
+            <a:off x="8394135" y="1989029"/>
+            <a:ext cx="1912299" cy="347563"/>
+          </a:xfrm>
+          <a:prstGeom prst="roundRect">
+            <a:avLst/>
+          </a:prstGeom>
+          <a:ln>
+            <a:solidFill>
+              <a:schemeClr val="accent1">
+                <a:lumMod val="75000"/>
+              </a:schemeClr>
+            </a:solidFill>
+          </a:ln>
+        </p:spPr>
+        <p:style>
+          <a:lnRef idx="2">
+            <a:schemeClr val="accent6"/>
+          </a:lnRef>
+          <a:fillRef idx="1">
+            <a:schemeClr val="lt1"/>
+          </a:fillRef>
+          <a:effectRef idx="0">
+            <a:schemeClr val="accent6"/>
+          </a:effectRef>
+          <a:fontRef idx="minor">
+            <a:schemeClr val="dk1"/>
+          </a:fontRef>
+        </p:style>
+        <p:txBody>
+          <a:bodyPr rtlCol="0" anchor="ctr"/>
+          <a:lstStyle/>
+          <a:p>
+            <a:pPr algn="ctr"/>
+            <a:r>
+              <a:rPr lang="en-US" dirty="0"/>
+              <a:t>OS, Libs</a:t>
+            </a:r>
+          </a:p>
+        </p:txBody>
+      </p:sp>
+      <p:sp>
+        <p:nvSpPr>
+          <p:cNvPr id="42" name="TextBox 41"/>
+          <p:cNvSpPr txBox="1"/>
+          <p:nvPr/>
+        </p:nvSpPr>
+        <p:spPr>
+          <a:xfrm>
+            <a:off x="7889529" y="2400734"/>
+            <a:ext cx="2825248" cy="338554"/>
+          </a:xfrm>
+          <a:prstGeom prst="rect">
+            <a:avLst/>
+          </a:prstGeom>
+          <a:noFill/>
+        </p:spPr>
+        <p:txBody>
+          <a:bodyPr wrap="square" rtlCol="0">
+            <a:spAutoFit/>
+          </a:bodyPr>
+          <a:lstStyle/>
+          <a:p>
+            <a:pPr algn="ctr"/>
+            <a:r>
+              <a:rPr lang="en-US" sz="1600" dirty="0"/>
+              <a:t>Deploy on Target Platform</a:t>
+            </a:r>
+          </a:p>
+        </p:txBody>
+      </p:sp>
+      <p:cxnSp>
+        <p:nvCxnSpPr>
+          <p:cNvPr id="49" name="Straight Arrow Connector 48"/>
+          <p:cNvCxnSpPr>
+            <a:cxnSpLocks/>
+            <a:stCxn id="25" idx="3"/>
+            <a:endCxn id="31" idx="1"/>
+          </p:cNvCxnSpPr>
+          <p:nvPr/>
+        </p:nvCxnSpPr>
+        <p:spPr>
+          <a:xfrm>
+            <a:off x="6827699" y="1331439"/>
+            <a:ext cx="787829" cy="15739"/>
+          </a:xfrm>
+          <a:prstGeom prst="straightConnector1">
+            <a:avLst/>
+          </a:prstGeom>
+          <a:ln w="57150">
+            <a:tailEnd type="triangle"/>
+          </a:ln>
+        </p:spPr>
+        <p:style>
+          <a:lnRef idx="3">
+            <a:schemeClr val="accent1"/>
+          </a:lnRef>
+          <a:fillRef idx="0">
+            <a:schemeClr val="accent1"/>
+          </a:fillRef>
+          <a:effectRef idx="2">
+            <a:schemeClr val="accent1"/>
+          </a:effectRef>
+          <a:fontRef idx="minor">
+            <a:schemeClr val="tx1"/>
+          </a:fontRef>
+        </p:style>
+      </p:cxnSp>
+      <p:sp>
+        <p:nvSpPr>
+          <p:cNvPr id="24" name="TextBox 23"/>
+          <p:cNvSpPr txBox="1"/>
+          <p:nvPr/>
+        </p:nvSpPr>
+        <p:spPr>
+          <a:xfrm>
+            <a:off x="268138" y="243880"/>
+            <a:ext cx="4170298" cy="584775"/>
+          </a:xfrm>
+          <a:prstGeom prst="rect">
+            <a:avLst/>
+          </a:prstGeom>
+          <a:noFill/>
+          <a:ln>
+            <a:noFill/>
+            <a:prstDash val="lgDash"/>
+          </a:ln>
+        </p:spPr>
+        <p:txBody>
+          <a:bodyPr wrap="square" rtlCol="0">
+            <a:spAutoFit/>
+          </a:bodyPr>
+          <a:lstStyle/>
+          <a:p>
+            <a:r>
+              <a:rPr lang="en-US" sz="1600" b="1" dirty="0">
+                <a:solidFill>
+                  <a:srgbClr val="FF0000"/>
+                </a:solidFill>
+              </a:rPr>
+              <a:t>P Language: </a:t>
+            </a:r>
+          </a:p>
+          <a:p>
+            <a:r>
+              <a:rPr lang="en-US" sz="1600" dirty="0"/>
+              <a:t>A state machine based programming language.</a:t>
+            </a:r>
+          </a:p>
+        </p:txBody>
+      </p:sp>
+      <p:sp>
+        <p:nvSpPr>
+          <p:cNvPr id="50" name="TextBox 49"/>
+          <p:cNvSpPr txBox="1"/>
+          <p:nvPr/>
+        </p:nvSpPr>
+        <p:spPr>
+          <a:xfrm>
+            <a:off x="5542259" y="5536901"/>
+            <a:ext cx="5703751" cy="830997"/>
+          </a:xfrm>
+          <a:prstGeom prst="rect">
+            <a:avLst/>
+          </a:prstGeom>
+          <a:noFill/>
+          <a:ln>
+            <a:noFill/>
+            <a:prstDash val="dash"/>
+          </a:ln>
+        </p:spPr>
+        <p:txBody>
+          <a:bodyPr wrap="square" rtlCol="0">
+            <a:spAutoFit/>
+          </a:bodyPr>
+          <a:lstStyle/>
+          <a:p>
+            <a:r>
+              <a:rPr lang="en-US" sz="1600" b="1" dirty="0">
+                <a:solidFill>
+                  <a:srgbClr val="FF0000"/>
+                </a:solidFill>
+              </a:rPr>
+              <a:t>Backend Analysis Engines:</a:t>
+            </a:r>
+          </a:p>
+          <a:p>
+            <a:r>
+              <a:rPr lang="en-US" sz="1600" dirty="0"/>
+              <a:t>search prioritization based systematic testing, model checking, symbolic execution, and deductive verification.</a:t>
+            </a:r>
+          </a:p>
+        </p:txBody>
+      </p:sp>
+      <p:sp>
+        <p:nvSpPr>
+          <p:cNvPr id="51" name="TextBox 50"/>
+          <p:cNvSpPr txBox="1"/>
+          <p:nvPr/>
+        </p:nvSpPr>
+        <p:spPr>
+          <a:xfrm>
+            <a:off x="7240627" y="2889370"/>
+            <a:ext cx="4126002" cy="584775"/>
+          </a:xfrm>
+          <a:prstGeom prst="rect">
+            <a:avLst/>
+          </a:prstGeom>
+          <a:noFill/>
+          <a:ln>
+            <a:noFill/>
+            <a:prstDash val="dash"/>
+          </a:ln>
+        </p:spPr>
+        <p:txBody>
+          <a:bodyPr wrap="square" rtlCol="0">
+            <a:spAutoFit/>
+          </a:bodyPr>
+          <a:lstStyle/>
+          <a:p>
+            <a:r>
+              <a:rPr lang="en-US" sz="1600" b="1" dirty="0">
+                <a:solidFill>
+                  <a:srgbClr val="FF0000"/>
+                </a:solidFill>
+              </a:rPr>
+              <a:t>Code Generation: </a:t>
+            </a:r>
+            <a:r>
+              <a:rPr lang="en-US" sz="1600" dirty="0"/>
+              <a:t>Generate executable code in different languages.</a:t>
+            </a:r>
+          </a:p>
+        </p:txBody>
+      </p:sp>
+      <p:sp>
+        <p:nvSpPr>
+          <p:cNvPr id="47" name="Rounded Rectangle 46"/>
+          <p:cNvSpPr/>
+          <p:nvPr/>
+        </p:nvSpPr>
+        <p:spPr>
+          <a:xfrm>
+            <a:off x="7689169" y="429257"/>
+            <a:ext cx="2011373" cy="1338060"/>
+          </a:xfrm>
+          <a:prstGeom prst="roundRect">
+            <a:avLst/>
+          </a:prstGeom>
+        </p:spPr>
+        <p:style>
+          <a:lnRef idx="1">
+            <a:schemeClr val="accent3"/>
+          </a:lnRef>
+          <a:fillRef idx="2">
+            <a:schemeClr val="accent3"/>
+          </a:fillRef>
+          <a:effectRef idx="1">
+            <a:schemeClr val="accent3"/>
+          </a:effectRef>
+          <a:fontRef idx="minor">
+            <a:schemeClr val="dk1"/>
+          </a:fontRef>
+        </p:style>
+        <p:txBody>
+          <a:bodyPr rtlCol="0" anchor="ctr"/>
+          <a:lstStyle/>
+          <a:p>
+            <a:pPr algn="ctr"/>
+            <a:endParaRPr lang="en-US" dirty="0"/>
+          </a:p>
+        </p:txBody>
+      </p:sp>
+      <p:sp>
+        <p:nvSpPr>
+          <p:cNvPr id="52" name="Rounded Rectangle 51"/>
+          <p:cNvSpPr/>
+          <p:nvPr/>
+        </p:nvSpPr>
+        <p:spPr>
+          <a:xfrm>
+            <a:off x="8136140" y="1235626"/>
+            <a:ext cx="1166013" cy="460582"/>
+          </a:xfrm>
+          <a:prstGeom prst="roundRect">
+            <a:avLst/>
+          </a:prstGeom>
+          <a:ln w="19050">
+            <a:prstDash val="sysDash"/>
+          </a:ln>
+        </p:spPr>
+        <p:style>
+          <a:lnRef idx="2">
+            <a:schemeClr val="dk1"/>
+          </a:lnRef>
+          <a:fillRef idx="1">
+            <a:schemeClr val="lt1"/>
+          </a:fillRef>
+          <a:effectRef idx="0">
+            <a:schemeClr val="dk1"/>
+          </a:effectRef>
+          <a:fontRef idx="minor">
+            <a:schemeClr val="dk1"/>
+          </a:fontRef>
+        </p:style>
+        <p:txBody>
+          <a:bodyPr rtlCol="0" anchor="ctr"/>
+          <a:lstStyle/>
+          <a:p>
+            <a:pPr algn="ctr"/>
+            <a:r>
+              <a:rPr lang="en-US" dirty="0"/>
+              <a:t>Wrapper</a:t>
+            </a:r>
+          </a:p>
+        </p:txBody>
+      </p:sp>
+      <p:sp>
+        <p:nvSpPr>
+          <p:cNvPr id="53" name="Rounded Rectangle 52"/>
+          <p:cNvSpPr/>
+          <p:nvPr/>
+        </p:nvSpPr>
+        <p:spPr>
+          <a:xfrm>
+            <a:off x="7778924" y="517273"/>
+            <a:ext cx="1853346" cy="609889"/>
+          </a:xfrm>
+          <a:prstGeom prst="roundRect">
+            <a:avLst/>
+          </a:prstGeom>
+          <a:ln w="19050">
+            <a:prstDash val="sysDash"/>
+          </a:ln>
+        </p:spPr>
+        <p:style>
+          <a:lnRef idx="2">
+            <a:schemeClr val="dk1"/>
+          </a:lnRef>
+          <a:fillRef idx="1">
+            <a:schemeClr val="lt1"/>
+          </a:fillRef>
+          <a:effectRef idx="0">
+            <a:schemeClr val="dk1"/>
+          </a:effectRef>
+          <a:fontRef idx="minor">
+            <a:schemeClr val="dk1"/>
+          </a:fontRef>
+        </p:style>
+        <p:txBody>
+          <a:bodyPr rtlCol="0" anchor="ctr"/>
+          <a:lstStyle/>
+          <a:p>
+            <a:pPr algn="ctr"/>
+            <a:r>
+              <a:rPr lang="en-US" dirty="0" err="1"/>
+              <a:t>Autogen</a:t>
+            </a:r>
+            <a:r>
+              <a:rPr lang="en-US" dirty="0"/>
+              <a:t>. </a:t>
+            </a:r>
+            <a:r>
+              <a:rPr lang="en-US" dirty="0" err="1"/>
+              <a:t>Impl</a:t>
+            </a:r>
+            <a:r>
+              <a:rPr lang="en-US" dirty="0"/>
+              <a:t>.</a:t>
+            </a:r>
+          </a:p>
+          <a:p>
+            <a:pPr algn="ctr"/>
+            <a:r>
+              <a:rPr lang="en-US" dirty="0"/>
+              <a:t>(C/C#/Java)</a:t>
+            </a:r>
+          </a:p>
+        </p:txBody>
+      </p:sp>
+      <p:sp>
+        <p:nvSpPr>
+          <p:cNvPr id="32" name="Rectangle: Rounded Corners 23">
             <a:extLst>
               <a:ext uri="{FF2B5EF4-FFF2-40B4-BE49-F238E27FC236}">
-                <a16:creationId xmlns:a16="http://schemas.microsoft.com/office/drawing/2014/main" id="{252EC619-9761-524B-9C4F-582347006BD9}"/>
+                <a16:creationId xmlns:a16="http://schemas.microsoft.com/office/drawing/2014/main" id="{70CEEB51-5BEB-4149-A18D-2DE9ECB3988D}"/>
               </a:ext>
             </a:extLst>
           </p:cNvPr>
-          <p:cNvGrpSpPr/>
+          <p:cNvSpPr/>
           <p:nvPr/>
-        </p:nvGrpSpPr>
-        <p:grpSpPr>
-          <a:xfrm>
-            <a:off x="268138" y="243880"/>
-            <a:ext cx="11098491" cy="6124018"/>
-            <a:chOff x="268138" y="243880"/>
-            <a:chExt cx="11098491" cy="6124018"/>
-          </a:xfrm>
-        </p:grpSpPr>
-        <p:grpSp>
-          <p:nvGrpSpPr>
-            <p:cNvPr id="6" name="Group 5">
-              <a:extLst>
-                <a:ext uri="{FF2B5EF4-FFF2-40B4-BE49-F238E27FC236}">
-                  <a16:creationId xmlns:a16="http://schemas.microsoft.com/office/drawing/2014/main" id="{A429F805-3220-DB44-8C80-B6E14C0752BE}"/>
-                </a:ext>
-              </a:extLst>
-            </p:cNvPr>
-            <p:cNvGrpSpPr/>
-            <p:nvPr/>
-          </p:nvGrpSpPr>
-          <p:grpSpPr>
-            <a:xfrm>
-              <a:off x="268138" y="243880"/>
-              <a:ext cx="11098491" cy="6124018"/>
-              <a:chOff x="124300" y="219678"/>
-              <a:chExt cx="11098491" cy="6124018"/>
-            </a:xfrm>
-          </p:grpSpPr>
-          <p:sp>
-            <p:nvSpPr>
-              <p:cNvPr id="35" name="Rounded Rectangle 34"/>
-              <p:cNvSpPr/>
-              <p:nvPr/>
-            </p:nvSpPr>
-            <p:spPr>
-              <a:xfrm>
-                <a:off x="1669238" y="1910752"/>
-                <a:ext cx="2104961" cy="2417945"/>
-              </a:xfrm>
-              <a:prstGeom prst="roundRect">
-                <a:avLst/>
-              </a:prstGeom>
-              <a:solidFill>
-                <a:schemeClr val="accent1">
-                  <a:lumMod val="40000"/>
-                  <a:lumOff val="60000"/>
-                </a:schemeClr>
-              </a:solidFill>
-            </p:spPr>
-            <p:style>
-              <a:lnRef idx="2">
-                <a:schemeClr val="accent1">
-                  <a:shade val="50000"/>
-                </a:schemeClr>
-              </a:lnRef>
-              <a:fillRef idx="1">
-                <a:schemeClr val="accent1"/>
-              </a:fillRef>
-              <a:effectRef idx="0">
-                <a:schemeClr val="accent1"/>
-              </a:effectRef>
-              <a:fontRef idx="minor">
-                <a:schemeClr val="lt1"/>
-              </a:fontRef>
-            </p:style>
-            <p:txBody>
-              <a:bodyPr rtlCol="0" anchor="ctr"/>
-              <a:lstStyle/>
-              <a:p>
-                <a:pPr algn="ctr"/>
-                <a:endParaRPr lang="en-US"/>
-              </a:p>
-            </p:txBody>
-          </p:sp>
-          <p:sp>
-            <p:nvSpPr>
-              <p:cNvPr id="36" name="Rectangle 35"/>
-              <p:cNvSpPr/>
-              <p:nvPr/>
-            </p:nvSpPr>
-            <p:spPr>
-              <a:xfrm>
-                <a:off x="1859483" y="2100999"/>
-                <a:ext cx="1693788" cy="349804"/>
-              </a:xfrm>
-              <a:prstGeom prst="rect">
-                <a:avLst/>
-              </a:prstGeom>
-            </p:spPr>
-            <p:style>
-              <a:lnRef idx="2">
-                <a:schemeClr val="dk1"/>
-              </a:lnRef>
-              <a:fillRef idx="1">
-                <a:schemeClr val="lt1"/>
-              </a:fillRef>
-              <a:effectRef idx="0">
-                <a:schemeClr val="dk1"/>
-              </a:effectRef>
-              <a:fontRef idx="minor">
-                <a:schemeClr val="dk1"/>
-              </a:fontRef>
-            </p:style>
-            <p:txBody>
-              <a:bodyPr rtlCol="0" anchor="ctr"/>
-              <a:lstStyle/>
-              <a:p>
-                <a:pPr algn="ctr"/>
-                <a:r>
-                  <a:rPr lang="en-US" dirty="0"/>
-                  <a:t>Implementation</a:t>
-                </a:r>
-              </a:p>
-            </p:txBody>
-          </p:sp>
-          <p:sp>
-            <p:nvSpPr>
-              <p:cNvPr id="38" name="Rectangle 37"/>
-              <p:cNvSpPr/>
-              <p:nvPr/>
-            </p:nvSpPr>
-            <p:spPr>
-              <a:xfrm>
-                <a:off x="1874824" y="2641050"/>
-                <a:ext cx="1693788" cy="349804"/>
-              </a:xfrm>
-              <a:prstGeom prst="rect">
-                <a:avLst/>
-              </a:prstGeom>
-            </p:spPr>
-            <p:style>
-              <a:lnRef idx="2">
-                <a:schemeClr val="dk1"/>
-              </a:lnRef>
-              <a:fillRef idx="1">
-                <a:schemeClr val="lt1"/>
-              </a:fillRef>
-              <a:effectRef idx="0">
-                <a:schemeClr val="dk1"/>
-              </a:effectRef>
-              <a:fontRef idx="minor">
-                <a:schemeClr val="dk1"/>
-              </a:fontRef>
-            </p:style>
-            <p:txBody>
-              <a:bodyPr rtlCol="0" anchor="ctr"/>
-              <a:lstStyle/>
-              <a:p>
-                <a:pPr algn="ctr"/>
-                <a:r>
-                  <a:rPr lang="en-US" dirty="0"/>
-                  <a:t>Specifications</a:t>
-                </a:r>
-              </a:p>
-            </p:txBody>
-          </p:sp>
-          <p:sp>
-            <p:nvSpPr>
-              <p:cNvPr id="39" name="Rectangle 38"/>
-              <p:cNvSpPr/>
-              <p:nvPr/>
-            </p:nvSpPr>
-            <p:spPr>
-              <a:xfrm>
-                <a:off x="1874824" y="3181101"/>
-                <a:ext cx="1693788" cy="349804"/>
-              </a:xfrm>
-              <a:prstGeom prst="rect">
-                <a:avLst/>
-              </a:prstGeom>
-            </p:spPr>
-            <p:style>
-              <a:lnRef idx="2">
-                <a:schemeClr val="dk1"/>
-              </a:lnRef>
-              <a:fillRef idx="1">
-                <a:schemeClr val="lt1"/>
-              </a:fillRef>
-              <a:effectRef idx="0">
-                <a:schemeClr val="dk1"/>
-              </a:effectRef>
-              <a:fontRef idx="minor">
-                <a:schemeClr val="dk1"/>
-              </a:fontRef>
-            </p:style>
-            <p:txBody>
-              <a:bodyPr rtlCol="0" anchor="ctr"/>
-              <a:lstStyle/>
-              <a:p>
-                <a:pPr algn="ctr"/>
-                <a:r>
-                  <a:rPr lang="en-US" dirty="0"/>
-                  <a:t>Abstractions</a:t>
-                </a:r>
-              </a:p>
-            </p:txBody>
-          </p:sp>
-          <p:sp>
-            <p:nvSpPr>
-              <p:cNvPr id="40" name="Rectangle 39"/>
-              <p:cNvSpPr/>
-              <p:nvPr/>
-            </p:nvSpPr>
-            <p:spPr>
-              <a:xfrm>
-                <a:off x="1874824" y="3757980"/>
-                <a:ext cx="1693788" cy="349804"/>
-              </a:xfrm>
-              <a:prstGeom prst="rect">
-                <a:avLst/>
-              </a:prstGeom>
-            </p:spPr>
-            <p:style>
-              <a:lnRef idx="2">
-                <a:schemeClr val="dk1"/>
-              </a:lnRef>
-              <a:fillRef idx="1">
-                <a:schemeClr val="lt1"/>
-              </a:fillRef>
-              <a:effectRef idx="0">
-                <a:schemeClr val="dk1"/>
-              </a:effectRef>
-              <a:fontRef idx="minor">
-                <a:schemeClr val="dk1"/>
-              </a:fontRef>
-            </p:style>
-            <p:txBody>
-              <a:bodyPr rtlCol="0" anchor="ctr"/>
-              <a:lstStyle/>
-              <a:p>
-                <a:pPr algn="ctr"/>
-                <a:r>
-                  <a:rPr lang="en-US" dirty="0"/>
-                  <a:t>Tests</a:t>
-                </a:r>
-              </a:p>
-            </p:txBody>
-          </p:sp>
-          <p:sp>
-            <p:nvSpPr>
-              <p:cNvPr id="41" name="TextBox 40"/>
-              <p:cNvSpPr txBox="1"/>
-              <p:nvPr/>
-            </p:nvSpPr>
-            <p:spPr>
-              <a:xfrm>
-                <a:off x="2090648" y="1457094"/>
-                <a:ext cx="1262140" cy="400110"/>
-              </a:xfrm>
-              <a:prstGeom prst="rect">
-                <a:avLst/>
-              </a:prstGeom>
-              <a:noFill/>
-            </p:spPr>
-            <p:txBody>
-              <a:bodyPr wrap="none" rtlCol="0">
-                <a:spAutoFit/>
-              </a:bodyPr>
-              <a:lstStyle/>
-              <a:p>
-                <a:r>
-                  <a:rPr lang="en-US" sz="2000" dirty="0">
-                    <a:solidFill>
-                      <a:srgbClr val="00B0F0"/>
-                    </a:solidFill>
-                  </a:rPr>
-                  <a:t>P</a:t>
-                </a:r>
-                <a:r>
-                  <a:rPr lang="en-US" sz="2000" dirty="0"/>
-                  <a:t> Program</a:t>
-                </a:r>
-              </a:p>
-            </p:txBody>
-          </p:sp>
-          <p:cxnSp>
-            <p:nvCxnSpPr>
-              <p:cNvPr id="43" name="Straight Arrow Connector 42"/>
-              <p:cNvCxnSpPr>
-                <a:stCxn id="35" idx="3"/>
-                <a:endCxn id="45" idx="2"/>
-              </p:cNvCxnSpPr>
-              <p:nvPr/>
-            </p:nvCxnSpPr>
-            <p:spPr>
-              <a:xfrm flipV="1">
-                <a:off x="3774199" y="3119724"/>
-                <a:ext cx="1098509" cy="1"/>
-              </a:xfrm>
-              <a:prstGeom prst="straightConnector1">
-                <a:avLst/>
-              </a:prstGeom>
-              <a:ln w="57150">
-                <a:tailEnd type="triangle"/>
-              </a:ln>
-            </p:spPr>
-            <p:style>
-              <a:lnRef idx="3">
-                <a:schemeClr val="accent1"/>
-              </a:lnRef>
-              <a:fillRef idx="0">
-                <a:schemeClr val="accent1"/>
-              </a:fillRef>
-              <a:effectRef idx="2">
-                <a:schemeClr val="accent1"/>
-              </a:effectRef>
-              <a:fontRef idx="minor">
-                <a:schemeClr val="tx1"/>
-              </a:fontRef>
-            </p:style>
-          </p:cxnSp>
-          <p:sp>
-            <p:nvSpPr>
-              <p:cNvPr id="45" name="Oval 44"/>
-              <p:cNvSpPr/>
-              <p:nvPr/>
-            </p:nvSpPr>
-            <p:spPr>
-              <a:xfrm>
-                <a:off x="4872708" y="2507566"/>
-                <a:ext cx="1564913" cy="1224316"/>
-              </a:xfrm>
-              <a:prstGeom prst="ellipse">
-                <a:avLst/>
-              </a:prstGeom>
-            </p:spPr>
-            <p:style>
-              <a:lnRef idx="1">
-                <a:schemeClr val="accent1"/>
-              </a:lnRef>
-              <a:fillRef idx="2">
-                <a:schemeClr val="accent1"/>
-              </a:fillRef>
-              <a:effectRef idx="1">
-                <a:schemeClr val="accent1"/>
-              </a:effectRef>
-              <a:fontRef idx="minor">
-                <a:schemeClr val="dk1"/>
-              </a:fontRef>
-            </p:style>
-            <p:txBody>
-              <a:bodyPr rtlCol="0" anchor="ctr"/>
-              <a:lstStyle/>
-              <a:p>
-                <a:pPr algn="ctr"/>
-                <a:r>
-                  <a:rPr lang="en-US" dirty="0"/>
-                  <a:t>Compiler</a:t>
-                </a:r>
-              </a:p>
-              <a:p>
-                <a:pPr algn="ctr"/>
-                <a:r>
-                  <a:rPr lang="en-US" dirty="0"/>
-                  <a:t>Toolchain</a:t>
-                </a:r>
-              </a:p>
-            </p:txBody>
-          </p:sp>
-          <p:sp>
-            <p:nvSpPr>
-              <p:cNvPr id="2" name="Rounded Rectangle 1"/>
-              <p:cNvSpPr/>
-              <p:nvPr/>
-            </p:nvSpPr>
-            <p:spPr>
-              <a:xfrm>
-                <a:off x="4898789" y="4135510"/>
-                <a:ext cx="1512749" cy="632654"/>
-              </a:xfrm>
-              <a:prstGeom prst="roundRect">
-                <a:avLst/>
-              </a:prstGeom>
-            </p:spPr>
-            <p:style>
-              <a:lnRef idx="1">
-                <a:schemeClr val="accent3"/>
-              </a:lnRef>
-              <a:fillRef idx="2">
-                <a:schemeClr val="accent3"/>
-              </a:fillRef>
-              <a:effectRef idx="1">
-                <a:schemeClr val="accent3"/>
-              </a:effectRef>
-              <a:fontRef idx="minor">
-                <a:schemeClr val="dk1"/>
-              </a:fontRef>
-            </p:style>
-            <p:txBody>
-              <a:bodyPr rtlCol="0" anchor="ctr"/>
-              <a:lstStyle/>
-              <a:p>
-                <a:pPr algn="ctr"/>
-                <a:r>
-                  <a:rPr lang="en-US" dirty="0"/>
-                  <a:t>Intermediate Code</a:t>
-                </a:r>
-              </a:p>
-            </p:txBody>
-          </p:sp>
-          <p:cxnSp>
-            <p:nvCxnSpPr>
-              <p:cNvPr id="12" name="Straight Arrow Connector 11"/>
-              <p:cNvCxnSpPr>
-                <a:cxnSpLocks/>
-                <a:stCxn id="45" idx="4"/>
-                <a:endCxn id="2" idx="0"/>
-              </p:cNvCxnSpPr>
-              <p:nvPr/>
-            </p:nvCxnSpPr>
-            <p:spPr>
-              <a:xfrm flipH="1">
-                <a:off x="5655164" y="3731882"/>
-                <a:ext cx="1" cy="403628"/>
-              </a:xfrm>
-              <a:prstGeom prst="straightConnector1">
-                <a:avLst/>
-              </a:prstGeom>
-              <a:ln w="57150">
-                <a:tailEnd type="triangle"/>
-              </a:ln>
-            </p:spPr>
-            <p:style>
-              <a:lnRef idx="3">
-                <a:schemeClr val="accent1"/>
-              </a:lnRef>
-              <a:fillRef idx="0">
-                <a:schemeClr val="accent1"/>
-              </a:fillRef>
-              <a:effectRef idx="2">
-                <a:schemeClr val="accent1"/>
-              </a:effectRef>
-              <a:fontRef idx="minor">
-                <a:schemeClr val="tx1"/>
-              </a:fontRef>
-            </p:style>
-          </p:cxnSp>
-          <p:sp>
-            <p:nvSpPr>
-              <p:cNvPr id="18" name="Oval 17"/>
-              <p:cNvSpPr/>
-              <p:nvPr/>
-            </p:nvSpPr>
-            <p:spPr>
-              <a:xfrm>
-                <a:off x="7584201" y="3833542"/>
-                <a:ext cx="1682537" cy="1224316"/>
-              </a:xfrm>
-              <a:prstGeom prst="ellipse">
-                <a:avLst/>
-              </a:prstGeom>
-            </p:spPr>
-            <p:style>
-              <a:lnRef idx="1">
-                <a:schemeClr val="accent1"/>
-              </a:lnRef>
-              <a:fillRef idx="2">
-                <a:schemeClr val="accent1"/>
-              </a:fillRef>
-              <a:effectRef idx="1">
-                <a:schemeClr val="accent1"/>
-              </a:effectRef>
-              <a:fontRef idx="minor">
-                <a:schemeClr val="dk1"/>
-              </a:fontRef>
-            </p:style>
-            <p:txBody>
-              <a:bodyPr rtlCol="0" anchor="ctr"/>
-              <a:lstStyle/>
-              <a:p>
-                <a:pPr algn="ctr"/>
-                <a:r>
-                  <a:rPr lang="en-US" dirty="0"/>
-                  <a:t>P-Analysis-Engine</a:t>
-                </a:r>
-              </a:p>
-            </p:txBody>
-          </p:sp>
-          <p:cxnSp>
-            <p:nvCxnSpPr>
-              <p:cNvPr id="19" name="Straight Arrow Connector 18"/>
-              <p:cNvCxnSpPr>
-                <a:stCxn id="2" idx="3"/>
-                <a:endCxn id="18" idx="2"/>
-              </p:cNvCxnSpPr>
-              <p:nvPr/>
-            </p:nvCxnSpPr>
-            <p:spPr>
-              <a:xfrm flipV="1">
-                <a:off x="6411538" y="4445700"/>
-                <a:ext cx="1172663" cy="6137"/>
-              </a:xfrm>
-              <a:prstGeom prst="straightConnector1">
-                <a:avLst/>
-              </a:prstGeom>
-              <a:ln w="57150">
-                <a:tailEnd type="triangle"/>
-              </a:ln>
-            </p:spPr>
-            <p:style>
-              <a:lnRef idx="3">
-                <a:schemeClr val="accent1"/>
-              </a:lnRef>
-              <a:fillRef idx="0">
-                <a:schemeClr val="accent1"/>
-              </a:fillRef>
-              <a:effectRef idx="2">
-                <a:schemeClr val="accent1"/>
-              </a:effectRef>
-              <a:fontRef idx="minor">
-                <a:schemeClr val="tx1"/>
-              </a:fontRef>
-            </p:style>
-          </p:cxnSp>
-          <p:cxnSp>
-            <p:nvCxnSpPr>
-              <p:cNvPr id="11" name="Elbow Connector 10"/>
-              <p:cNvCxnSpPr>
-                <a:cxnSpLocks/>
-                <a:stCxn id="18" idx="4"/>
-                <a:endCxn id="35" idx="2"/>
-              </p:cNvCxnSpPr>
-              <p:nvPr/>
-            </p:nvCxnSpPr>
-            <p:spPr>
-              <a:xfrm rot="5400000" flipH="1">
-                <a:off x="5209014" y="1841403"/>
-                <a:ext cx="729161" cy="5703751"/>
-              </a:xfrm>
-              <a:prstGeom prst="bentConnector3">
-                <a:avLst>
-                  <a:gd name="adj1" fmla="val -31351"/>
-                </a:avLst>
-              </a:prstGeom>
-              <a:ln w="57150">
-                <a:solidFill>
-                  <a:srgbClr val="FF0000"/>
-                </a:solidFill>
-                <a:tailEnd type="triangle"/>
-              </a:ln>
-            </p:spPr>
-            <p:style>
-              <a:lnRef idx="3">
-                <a:schemeClr val="accent1"/>
-              </a:lnRef>
-              <a:fillRef idx="0">
-                <a:schemeClr val="accent1"/>
-              </a:fillRef>
-              <a:effectRef idx="2">
-                <a:schemeClr val="accent1"/>
-              </a:effectRef>
-              <a:fontRef idx="minor">
-                <a:schemeClr val="tx1"/>
-              </a:fontRef>
-            </p:style>
-          </p:cxnSp>
-          <p:sp>
-            <p:nvSpPr>
-              <p:cNvPr id="13" name="TextBox 12"/>
-              <p:cNvSpPr txBox="1"/>
-              <p:nvPr/>
-            </p:nvSpPr>
-            <p:spPr>
-              <a:xfrm>
-                <a:off x="4405493" y="5094107"/>
-                <a:ext cx="2499339" cy="338554"/>
-              </a:xfrm>
-              <a:prstGeom prst="rect">
-                <a:avLst/>
-              </a:prstGeom>
-              <a:solidFill>
-                <a:schemeClr val="bg1"/>
-              </a:solidFill>
-              <a:ln>
-                <a:solidFill>
-                  <a:schemeClr val="bg1"/>
-                </a:solidFill>
-              </a:ln>
-            </p:spPr>
-            <p:txBody>
-              <a:bodyPr wrap="square" rtlCol="0">
-                <a:spAutoFit/>
-              </a:bodyPr>
-              <a:lstStyle/>
-              <a:p>
-                <a:pPr algn="ctr"/>
-                <a:r>
-                  <a:rPr lang="en-US" sz="1600" dirty="0"/>
-                  <a:t>Reproducible Error Trace</a:t>
-                </a:r>
-              </a:p>
-            </p:txBody>
-          </p:sp>
-          <p:sp>
-            <p:nvSpPr>
-              <p:cNvPr id="25" name="Rounded Rectangle 24"/>
-              <p:cNvSpPr/>
-              <p:nvPr/>
-            </p:nvSpPr>
-            <p:spPr>
-              <a:xfrm>
-                <a:off x="4617258" y="614800"/>
-                <a:ext cx="2066603" cy="1384873"/>
-              </a:xfrm>
-              <a:prstGeom prst="roundRect">
-                <a:avLst/>
-              </a:prstGeom>
-            </p:spPr>
-            <p:style>
-              <a:lnRef idx="1">
-                <a:schemeClr val="accent3"/>
-              </a:lnRef>
-              <a:fillRef idx="2">
-                <a:schemeClr val="accent3"/>
-              </a:fillRef>
-              <a:effectRef idx="1">
-                <a:schemeClr val="accent3"/>
-              </a:effectRef>
-              <a:fontRef idx="minor">
-                <a:schemeClr val="dk1"/>
-              </a:fontRef>
-            </p:style>
-            <p:txBody>
-              <a:bodyPr rtlCol="0" anchor="ctr"/>
-              <a:lstStyle/>
-              <a:p>
-                <a:pPr algn="ctr"/>
-                <a:endParaRPr lang="en-US" dirty="0"/>
-              </a:p>
-            </p:txBody>
-          </p:sp>
-          <p:sp>
-            <p:nvSpPr>
-              <p:cNvPr id="14" name="Rounded Rectangle 13"/>
-              <p:cNvSpPr/>
-              <p:nvPr/>
-            </p:nvSpPr>
-            <p:spPr>
-              <a:xfrm>
-                <a:off x="5082640" y="1396622"/>
-                <a:ext cx="1166013" cy="460582"/>
-              </a:xfrm>
-              <a:prstGeom prst="roundRect">
-                <a:avLst/>
-              </a:prstGeom>
-              <a:ln w="19050">
-                <a:prstDash val="sysDash"/>
-              </a:ln>
-            </p:spPr>
-            <p:style>
-              <a:lnRef idx="2">
-                <a:schemeClr val="dk1"/>
-              </a:lnRef>
-              <a:fillRef idx="1">
-                <a:schemeClr val="lt1"/>
-              </a:fillRef>
-              <a:effectRef idx="0">
-                <a:schemeClr val="dk1"/>
-              </a:effectRef>
-              <a:fontRef idx="minor">
-                <a:schemeClr val="dk1"/>
-              </a:fontRef>
-            </p:style>
-            <p:txBody>
-              <a:bodyPr rtlCol="0" anchor="ctr"/>
-              <a:lstStyle/>
-              <a:p>
-                <a:pPr algn="ctr"/>
-                <a:r>
-                  <a:rPr lang="en-US" dirty="0"/>
-                  <a:t>Wrapper</a:t>
-                </a:r>
-              </a:p>
-            </p:txBody>
-          </p:sp>
-          <p:sp>
-            <p:nvSpPr>
-              <p:cNvPr id="27" name="Rounded Rectangle 26"/>
-              <p:cNvSpPr/>
-              <p:nvPr/>
-            </p:nvSpPr>
-            <p:spPr>
-              <a:xfrm>
-                <a:off x="4725424" y="678269"/>
-                <a:ext cx="1853346" cy="609889"/>
-              </a:xfrm>
-              <a:prstGeom prst="roundRect">
-                <a:avLst/>
-              </a:prstGeom>
-              <a:ln w="19050">
-                <a:prstDash val="sysDash"/>
-              </a:ln>
-            </p:spPr>
-            <p:style>
-              <a:lnRef idx="2">
-                <a:schemeClr val="dk1"/>
-              </a:lnRef>
-              <a:fillRef idx="1">
-                <a:schemeClr val="lt1"/>
-              </a:fillRef>
-              <a:effectRef idx="0">
-                <a:schemeClr val="dk1"/>
-              </a:effectRef>
-              <a:fontRef idx="minor">
-                <a:schemeClr val="dk1"/>
-              </a:fontRef>
-            </p:style>
-            <p:txBody>
-              <a:bodyPr rtlCol="0" anchor="ctr"/>
-              <a:lstStyle/>
-              <a:p>
-                <a:pPr algn="ctr"/>
-                <a:r>
-                  <a:rPr lang="en-US" dirty="0" err="1"/>
-                  <a:t>Autogen</a:t>
-                </a:r>
-                <a:r>
-                  <a:rPr lang="en-US" dirty="0"/>
-                  <a:t>. </a:t>
-                </a:r>
-                <a:r>
-                  <a:rPr lang="en-US" dirty="0" err="1"/>
-                  <a:t>Impl</a:t>
-                </a:r>
-                <a:r>
-                  <a:rPr lang="en-US" dirty="0"/>
-                  <a:t>.</a:t>
-                </a:r>
-              </a:p>
-              <a:p>
-                <a:pPr algn="ctr"/>
-                <a:r>
-                  <a:rPr lang="en-US" dirty="0"/>
-                  <a:t>(C/C#/Java)</a:t>
-                </a:r>
-              </a:p>
-            </p:txBody>
-          </p:sp>
-          <p:cxnSp>
-            <p:nvCxnSpPr>
-              <p:cNvPr id="28" name="Straight Arrow Connector 27"/>
-              <p:cNvCxnSpPr>
-                <a:stCxn id="45" idx="0"/>
-                <a:endCxn id="25" idx="2"/>
-              </p:cNvCxnSpPr>
-              <p:nvPr/>
-            </p:nvCxnSpPr>
-            <p:spPr>
-              <a:xfrm flipH="1" flipV="1">
-                <a:off x="5650560" y="1999673"/>
-                <a:ext cx="4605" cy="507893"/>
-              </a:xfrm>
-              <a:prstGeom prst="straightConnector1">
-                <a:avLst/>
-              </a:prstGeom>
-              <a:ln w="57150">
-                <a:tailEnd type="triangle"/>
-              </a:ln>
-            </p:spPr>
-            <p:style>
-              <a:lnRef idx="3">
-                <a:schemeClr val="accent1"/>
-              </a:lnRef>
-              <a:fillRef idx="0">
-                <a:schemeClr val="accent1"/>
-              </a:fillRef>
-              <a:effectRef idx="2">
-                <a:schemeClr val="accent1"/>
-              </a:effectRef>
-              <a:fontRef idx="minor">
-                <a:schemeClr val="tx1"/>
-              </a:fontRef>
-            </p:style>
-          </p:cxnSp>
-          <p:sp>
-            <p:nvSpPr>
-              <p:cNvPr id="31" name="Rectangle: Rounded Corners 20"/>
-              <p:cNvSpPr/>
-              <p:nvPr/>
-            </p:nvSpPr>
-            <p:spPr>
-              <a:xfrm>
-                <a:off x="7471690" y="296740"/>
-                <a:ext cx="3616667" cy="2052471"/>
-              </a:xfrm>
-              <a:prstGeom prst="roundRect">
-                <a:avLst/>
-              </a:prstGeom>
-              <a:solidFill>
-                <a:schemeClr val="accent1">
-                  <a:lumMod val="40000"/>
-                  <a:lumOff val="60000"/>
-                </a:schemeClr>
-              </a:solidFill>
-              <a:ln w="19050">
+        </p:nvSpPr>
+        <p:spPr>
+          <a:xfrm>
+            <a:off x="9738187" y="1176089"/>
+            <a:ext cx="1373137" cy="732504"/>
+          </a:xfrm>
+          <a:prstGeom prst="roundRect">
+            <a:avLst/>
+          </a:prstGeom>
+          <a:solidFill>
+            <a:schemeClr val="bg1"/>
+          </a:solidFill>
+          <a:ln>
+            <a:solidFill>
+              <a:schemeClr val="accent1">
+                <a:lumMod val="75000"/>
+              </a:schemeClr>
+            </a:solidFill>
+          </a:ln>
+        </p:spPr>
+        <p:style>
+          <a:lnRef idx="2">
+            <a:schemeClr val="accent6"/>
+          </a:lnRef>
+          <a:fillRef idx="1">
+            <a:schemeClr val="lt1"/>
+          </a:fillRef>
+          <a:effectRef idx="0">
+            <a:schemeClr val="accent6"/>
+          </a:effectRef>
+          <a:fontRef idx="minor">
+            <a:schemeClr val="dk1"/>
+          </a:fontRef>
+        </p:style>
+        <p:txBody>
+          <a:bodyPr rtlCol="0" anchor="ctr"/>
+          <a:lstStyle/>
+          <a:p>
+            <a:pPr algn="ctr"/>
+            <a:r>
+              <a:rPr lang="en-US" dirty="0">
                 <a:solidFill>
                   <a:schemeClr val="tx1"/>
                 </a:solidFill>
-                <a:prstDash val="lgDash"/>
-              </a:ln>
-            </p:spPr>
-            <p:style>
-              <a:lnRef idx="1">
-                <a:schemeClr val="accent5"/>
-              </a:lnRef>
-              <a:fillRef idx="2">
-                <a:schemeClr val="accent5"/>
-              </a:fillRef>
-              <a:effectRef idx="1">
-                <a:schemeClr val="accent5"/>
-              </a:effectRef>
-              <a:fontRef idx="minor">
-                <a:schemeClr val="dk1"/>
-              </a:fontRef>
-            </p:style>
-            <p:txBody>
-              <a:bodyPr rtlCol="0" anchor="ctr"/>
-              <a:lstStyle/>
-              <a:p>
-                <a:pPr algn="ctr"/>
-                <a:endParaRPr lang="en-US" dirty="0"/>
-              </a:p>
-            </p:txBody>
-          </p:sp>
-          <p:sp>
-            <p:nvSpPr>
-              <p:cNvPr id="34" name="Rectangle: Rounded Corners 23"/>
-              <p:cNvSpPr/>
-              <p:nvPr/>
-            </p:nvSpPr>
-            <p:spPr>
-              <a:xfrm>
-                <a:off x="9587386" y="414532"/>
-                <a:ext cx="1373138" cy="732504"/>
-              </a:xfrm>
-              <a:prstGeom prst="roundRect">
-                <a:avLst/>
-              </a:prstGeom>
-              <a:solidFill>
-                <a:schemeClr val="bg1"/>
-              </a:solidFill>
-              <a:ln>
+              </a:rPr>
+              <a:t>Runtime </a:t>
+            </a:r>
+          </a:p>
+          <a:p>
+            <a:pPr algn="ctr"/>
+            <a:r>
+              <a:rPr lang="en-US" dirty="0">
                 <a:solidFill>
-                  <a:schemeClr val="accent1">
-                    <a:lumMod val="75000"/>
-                  </a:schemeClr>
+                  <a:schemeClr val="tx1"/>
                 </a:solidFill>
-              </a:ln>
-            </p:spPr>
-            <p:style>
-              <a:lnRef idx="2">
-                <a:schemeClr val="accent6"/>
-              </a:lnRef>
-              <a:fillRef idx="1">
-                <a:schemeClr val="lt1"/>
-              </a:fillRef>
-              <a:effectRef idx="0">
-                <a:schemeClr val="accent6"/>
-              </a:effectRef>
-              <a:fontRef idx="minor">
-                <a:schemeClr val="dk1"/>
-              </a:fontRef>
-            </p:style>
-            <p:txBody>
-              <a:bodyPr rtlCol="0" anchor="ctr"/>
-              <a:lstStyle/>
-              <a:p>
-                <a:pPr algn="ctr"/>
-                <a:r>
-                  <a:rPr lang="en-US" dirty="0">
-                    <a:solidFill>
-                      <a:srgbClr val="00B0F0"/>
-                    </a:solidFill>
-                  </a:rPr>
-                  <a:t>P </a:t>
-                </a:r>
-                <a:r>
-                  <a:rPr lang="en-US" dirty="0"/>
-                  <a:t>Runtime</a:t>
-                </a:r>
-              </a:p>
-              <a:p>
-                <a:pPr algn="ctr"/>
-                <a:r>
-                  <a:rPr lang="en-US" dirty="0"/>
-                  <a:t>(C/C#/Java)</a:t>
-                </a:r>
-              </a:p>
-            </p:txBody>
-          </p:sp>
-          <p:sp>
-            <p:nvSpPr>
-              <p:cNvPr id="37" name="Rectangle: Rounded Corners 24"/>
-              <p:cNvSpPr/>
-              <p:nvPr/>
-            </p:nvSpPr>
-            <p:spPr>
-              <a:xfrm>
-                <a:off x="8250297" y="1964827"/>
-                <a:ext cx="1912299" cy="347563"/>
-              </a:xfrm>
-              <a:prstGeom prst="roundRect">
-                <a:avLst/>
-              </a:prstGeom>
-              <a:ln>
-                <a:solidFill>
-                  <a:schemeClr val="accent1">
-                    <a:lumMod val="75000"/>
-                  </a:schemeClr>
-                </a:solidFill>
-              </a:ln>
-            </p:spPr>
-            <p:style>
-              <a:lnRef idx="2">
-                <a:schemeClr val="accent6"/>
-              </a:lnRef>
-              <a:fillRef idx="1">
-                <a:schemeClr val="lt1"/>
-              </a:fillRef>
-              <a:effectRef idx="0">
-                <a:schemeClr val="accent6"/>
-              </a:effectRef>
-              <a:fontRef idx="minor">
-                <a:schemeClr val="dk1"/>
-              </a:fontRef>
-            </p:style>
-            <p:txBody>
-              <a:bodyPr rtlCol="0" anchor="ctr"/>
-              <a:lstStyle/>
-              <a:p>
-                <a:pPr algn="ctr"/>
-                <a:r>
-                  <a:rPr lang="en-US" dirty="0"/>
-                  <a:t>OS, Libs</a:t>
-                </a:r>
-              </a:p>
-            </p:txBody>
-          </p:sp>
-          <p:sp>
-            <p:nvSpPr>
-              <p:cNvPr id="42" name="TextBox 41"/>
-              <p:cNvSpPr txBox="1"/>
-              <p:nvPr/>
-            </p:nvSpPr>
-            <p:spPr>
-              <a:xfrm>
-                <a:off x="7745691" y="2376532"/>
-                <a:ext cx="2825248" cy="338554"/>
-              </a:xfrm>
-              <a:prstGeom prst="rect">
-                <a:avLst/>
-              </a:prstGeom>
-              <a:noFill/>
-            </p:spPr>
-            <p:txBody>
-              <a:bodyPr wrap="square" rtlCol="0">
-                <a:spAutoFit/>
-              </a:bodyPr>
-              <a:lstStyle/>
-              <a:p>
-                <a:pPr algn="ctr"/>
-                <a:r>
-                  <a:rPr lang="en-US" sz="1600" dirty="0"/>
-                  <a:t>Deploy on Target Platform</a:t>
-                </a:r>
-              </a:p>
-            </p:txBody>
-          </p:sp>
-          <p:cxnSp>
-            <p:nvCxnSpPr>
-              <p:cNvPr id="49" name="Straight Arrow Connector 48"/>
-              <p:cNvCxnSpPr>
-                <a:cxnSpLocks/>
-                <a:stCxn id="25" idx="3"/>
-                <a:endCxn id="31" idx="1"/>
-              </p:cNvCxnSpPr>
-              <p:nvPr/>
-            </p:nvCxnSpPr>
-            <p:spPr>
-              <a:xfrm>
-                <a:off x="6683861" y="1307237"/>
-                <a:ext cx="787829" cy="15739"/>
-              </a:xfrm>
-              <a:prstGeom prst="straightConnector1">
-                <a:avLst/>
-              </a:prstGeom>
-              <a:ln w="57150">
-                <a:tailEnd type="triangle"/>
-              </a:ln>
-            </p:spPr>
-            <p:style>
-              <a:lnRef idx="3">
-                <a:schemeClr val="accent1"/>
-              </a:lnRef>
-              <a:fillRef idx="0">
-                <a:schemeClr val="accent1"/>
-              </a:fillRef>
-              <a:effectRef idx="2">
-                <a:schemeClr val="accent1"/>
-              </a:effectRef>
-              <a:fontRef idx="minor">
-                <a:schemeClr val="tx1"/>
-              </a:fontRef>
-            </p:style>
-          </p:cxnSp>
-          <p:sp>
-            <p:nvSpPr>
-              <p:cNvPr id="24" name="TextBox 23"/>
-              <p:cNvSpPr txBox="1"/>
-              <p:nvPr/>
-            </p:nvSpPr>
-            <p:spPr>
-              <a:xfrm>
-                <a:off x="124300" y="219678"/>
-                <a:ext cx="4170298" cy="584775"/>
-              </a:xfrm>
-              <a:prstGeom prst="rect">
-                <a:avLst/>
-              </a:prstGeom>
-              <a:noFill/>
-              <a:ln>
-                <a:solidFill>
-                  <a:schemeClr val="accent1"/>
-                </a:solidFill>
-                <a:prstDash val="lgDash"/>
-              </a:ln>
-            </p:spPr>
-            <p:txBody>
-              <a:bodyPr wrap="square" rtlCol="0">
-                <a:spAutoFit/>
-              </a:bodyPr>
-              <a:lstStyle/>
-              <a:p>
-                <a:r>
-                  <a:rPr lang="en-US" sz="1600" b="1" dirty="0">
-                    <a:solidFill>
-                      <a:srgbClr val="FF0000"/>
-                    </a:solidFill>
-                  </a:rPr>
-                  <a:t>P Language: </a:t>
-                </a:r>
-              </a:p>
-              <a:p>
-                <a:r>
-                  <a:rPr lang="en-US" sz="1600" dirty="0"/>
-                  <a:t>A state machine based programming language.</a:t>
-                </a:r>
-              </a:p>
-            </p:txBody>
-          </p:sp>
-          <p:sp>
-            <p:nvSpPr>
-              <p:cNvPr id="50" name="TextBox 49"/>
-              <p:cNvSpPr txBox="1"/>
-              <p:nvPr/>
-            </p:nvSpPr>
-            <p:spPr>
-              <a:xfrm>
-                <a:off x="5398421" y="5512699"/>
-                <a:ext cx="5703751" cy="830997"/>
-              </a:xfrm>
-              <a:prstGeom prst="rect">
-                <a:avLst/>
-              </a:prstGeom>
-              <a:noFill/>
-              <a:ln>
-                <a:solidFill>
-                  <a:schemeClr val="accent1"/>
-                </a:solidFill>
-                <a:prstDash val="dash"/>
-              </a:ln>
-            </p:spPr>
-            <p:txBody>
-              <a:bodyPr wrap="square" rtlCol="0">
-                <a:spAutoFit/>
-              </a:bodyPr>
-              <a:lstStyle/>
-              <a:p>
-                <a:r>
-                  <a:rPr lang="en-US" sz="1600" b="1" dirty="0">
-                    <a:solidFill>
-                      <a:srgbClr val="FF0000"/>
-                    </a:solidFill>
-                  </a:rPr>
-                  <a:t>Backend Analysis Engines:</a:t>
-                </a:r>
-              </a:p>
-              <a:p>
-                <a:r>
-                  <a:rPr lang="en-US" sz="1600"/>
-                  <a:t>search </a:t>
-                </a:r>
-                <a:r>
-                  <a:rPr lang="en-US" sz="1600" dirty="0"/>
-                  <a:t>prioritization based systematic testing, model checking, </a:t>
-                </a:r>
-                <a:r>
-                  <a:rPr lang="en-US" sz="1600"/>
-                  <a:t>symbolic execution, </a:t>
-                </a:r>
-                <a:r>
-                  <a:rPr lang="en-US" sz="1600" dirty="0"/>
-                  <a:t>and deductive verification.</a:t>
-                </a:r>
-              </a:p>
-            </p:txBody>
-          </p:sp>
-          <p:sp>
-            <p:nvSpPr>
-              <p:cNvPr id="51" name="TextBox 50"/>
-              <p:cNvSpPr txBox="1"/>
-              <p:nvPr/>
-            </p:nvSpPr>
-            <p:spPr>
-              <a:xfrm>
-                <a:off x="7096789" y="2721332"/>
-                <a:ext cx="4126002" cy="584775"/>
-              </a:xfrm>
-              <a:prstGeom prst="rect">
-                <a:avLst/>
-              </a:prstGeom>
-              <a:noFill/>
-              <a:ln>
-                <a:solidFill>
-                  <a:schemeClr val="accent1"/>
-                </a:solidFill>
-                <a:prstDash val="dash"/>
-              </a:ln>
-            </p:spPr>
-            <p:txBody>
-              <a:bodyPr wrap="square" rtlCol="0">
-                <a:spAutoFit/>
-              </a:bodyPr>
-              <a:lstStyle/>
-              <a:p>
-                <a:r>
-                  <a:rPr lang="en-US" sz="1600" b="1" dirty="0">
-                    <a:solidFill>
-                      <a:srgbClr val="FF0000"/>
-                    </a:solidFill>
-                  </a:rPr>
-                  <a:t>Code Generation: </a:t>
-                </a:r>
-                <a:r>
-                  <a:rPr lang="en-US" sz="1600" dirty="0"/>
-                  <a:t>Generate executable code in different languages.</a:t>
-                </a:r>
-              </a:p>
-            </p:txBody>
-          </p:sp>
-          <p:sp>
-            <p:nvSpPr>
-              <p:cNvPr id="47" name="Rounded Rectangle 46"/>
-              <p:cNvSpPr/>
-              <p:nvPr/>
-            </p:nvSpPr>
-            <p:spPr>
-              <a:xfrm>
-                <a:off x="7545331" y="405055"/>
-                <a:ext cx="2011373" cy="1338060"/>
-              </a:xfrm>
-              <a:prstGeom prst="roundRect">
-                <a:avLst/>
-              </a:prstGeom>
-            </p:spPr>
-            <p:style>
-              <a:lnRef idx="1">
-                <a:schemeClr val="accent3"/>
-              </a:lnRef>
-              <a:fillRef idx="2">
-                <a:schemeClr val="accent3"/>
-              </a:fillRef>
-              <a:effectRef idx="1">
-                <a:schemeClr val="accent3"/>
-              </a:effectRef>
-              <a:fontRef idx="minor">
-                <a:schemeClr val="dk1"/>
-              </a:fontRef>
-            </p:style>
-            <p:txBody>
-              <a:bodyPr rtlCol="0" anchor="ctr"/>
-              <a:lstStyle/>
-              <a:p>
-                <a:pPr algn="ctr"/>
-                <a:endParaRPr lang="en-US" dirty="0"/>
-              </a:p>
-            </p:txBody>
-          </p:sp>
-          <p:sp>
-            <p:nvSpPr>
-              <p:cNvPr id="52" name="Rounded Rectangle 51"/>
-              <p:cNvSpPr/>
-              <p:nvPr/>
-            </p:nvSpPr>
-            <p:spPr>
-              <a:xfrm>
-                <a:off x="7992302" y="1211424"/>
-                <a:ext cx="1166013" cy="460582"/>
-              </a:xfrm>
-              <a:prstGeom prst="roundRect">
-                <a:avLst/>
-              </a:prstGeom>
-              <a:ln w="19050">
-                <a:prstDash val="sysDash"/>
-              </a:ln>
-            </p:spPr>
-            <p:style>
-              <a:lnRef idx="2">
-                <a:schemeClr val="dk1"/>
-              </a:lnRef>
-              <a:fillRef idx="1">
-                <a:schemeClr val="lt1"/>
-              </a:fillRef>
-              <a:effectRef idx="0">
-                <a:schemeClr val="dk1"/>
-              </a:effectRef>
-              <a:fontRef idx="minor">
-                <a:schemeClr val="dk1"/>
-              </a:fontRef>
-            </p:style>
-            <p:txBody>
-              <a:bodyPr rtlCol="0" anchor="ctr"/>
-              <a:lstStyle/>
-              <a:p>
-                <a:pPr algn="ctr"/>
-                <a:r>
-                  <a:rPr lang="en-US" dirty="0"/>
-                  <a:t>Wrapper</a:t>
-                </a:r>
-              </a:p>
-            </p:txBody>
-          </p:sp>
-          <p:sp>
-            <p:nvSpPr>
-              <p:cNvPr id="53" name="Rounded Rectangle 52"/>
-              <p:cNvSpPr/>
-              <p:nvPr/>
-            </p:nvSpPr>
-            <p:spPr>
-              <a:xfrm>
-                <a:off x="7635086" y="493071"/>
-                <a:ext cx="1853346" cy="609889"/>
-              </a:xfrm>
-              <a:prstGeom prst="roundRect">
-                <a:avLst/>
-              </a:prstGeom>
-              <a:ln w="19050">
-                <a:prstDash val="sysDash"/>
-              </a:ln>
-            </p:spPr>
-            <p:style>
-              <a:lnRef idx="2">
-                <a:schemeClr val="dk1"/>
-              </a:lnRef>
-              <a:fillRef idx="1">
-                <a:schemeClr val="lt1"/>
-              </a:fillRef>
-              <a:effectRef idx="0">
-                <a:schemeClr val="dk1"/>
-              </a:effectRef>
-              <a:fontRef idx="minor">
-                <a:schemeClr val="dk1"/>
-              </a:fontRef>
-            </p:style>
-            <p:txBody>
-              <a:bodyPr rtlCol="0" anchor="ctr"/>
-              <a:lstStyle/>
-              <a:p>
-                <a:pPr algn="ctr"/>
-                <a:r>
-                  <a:rPr lang="en-US" dirty="0" err="1"/>
-                  <a:t>Autogen</a:t>
-                </a:r>
-                <a:r>
-                  <a:rPr lang="en-US" dirty="0"/>
-                  <a:t>. </a:t>
-                </a:r>
-                <a:r>
-                  <a:rPr lang="en-US" dirty="0" err="1"/>
-                  <a:t>Impl</a:t>
-                </a:r>
-                <a:r>
-                  <a:rPr lang="en-US" dirty="0"/>
-                  <a:t>.</a:t>
-                </a:r>
-              </a:p>
-              <a:p>
-                <a:pPr algn="ctr"/>
-                <a:r>
-                  <a:rPr lang="en-US" dirty="0"/>
-                  <a:t>(C/C#/Java)</a:t>
-                </a:r>
-              </a:p>
-            </p:txBody>
-          </p:sp>
-        </p:grpSp>
-        <p:sp>
-          <p:nvSpPr>
-            <p:cNvPr id="32" name="Rectangle: Rounded Corners 23">
-              <a:extLst>
-                <a:ext uri="{FF2B5EF4-FFF2-40B4-BE49-F238E27FC236}">
-                  <a16:creationId xmlns:a16="http://schemas.microsoft.com/office/drawing/2014/main" id="{70CEEB51-5BEB-4149-A18D-2DE9ECB3988D}"/>
-                </a:ext>
-              </a:extLst>
-            </p:cNvPr>
-            <p:cNvSpPr/>
-            <p:nvPr/>
-          </p:nvSpPr>
-          <p:spPr>
-            <a:xfrm>
-              <a:off x="9738187" y="1176089"/>
-              <a:ext cx="1373137" cy="732504"/>
-            </a:xfrm>
-            <a:prstGeom prst="roundRect">
-              <a:avLst/>
-            </a:prstGeom>
-            <a:solidFill>
-              <a:schemeClr val="bg1"/>
-            </a:solidFill>
-            <a:ln>
-              <a:solidFill>
-                <a:schemeClr val="accent1">
-                  <a:lumMod val="75000"/>
-                </a:schemeClr>
-              </a:solidFill>
-            </a:ln>
-          </p:spPr>
-          <p:style>
-            <a:lnRef idx="2">
-              <a:schemeClr val="accent6"/>
-            </a:lnRef>
-            <a:fillRef idx="1">
-              <a:schemeClr val="lt1"/>
-            </a:fillRef>
-            <a:effectRef idx="0">
-              <a:schemeClr val="accent6"/>
-            </a:effectRef>
-            <a:fontRef idx="minor">
-              <a:schemeClr val="dk1"/>
-            </a:fontRef>
-          </p:style>
-          <p:txBody>
-            <a:bodyPr rtlCol="0" anchor="ctr"/>
-            <a:lstStyle/>
-            <a:p>
-              <a:pPr algn="ctr"/>
-              <a:r>
-                <a:rPr lang="en-US" dirty="0">
-                  <a:solidFill>
-                    <a:schemeClr val="tx1"/>
-                  </a:solidFill>
-                </a:rPr>
-                <a:t>Runtime </a:t>
-              </a:r>
-            </a:p>
-            <a:p>
-              <a:pPr algn="ctr"/>
-              <a:r>
-                <a:rPr lang="en-US" dirty="0">
-                  <a:solidFill>
-                    <a:schemeClr val="tx1"/>
-                  </a:solidFill>
-                </a:rPr>
-                <a:t>Monitoring</a:t>
-              </a:r>
-            </a:p>
-          </p:txBody>
-        </p:sp>
-      </p:grpSp>
+              </a:rPr>
+              <a:t>Monitoring</a:t>
+            </a:r>
+          </a:p>
+        </p:txBody>
+      </p:sp>
     </p:spTree>
     <p:extLst>
       <p:ext uri="{BB962C8B-B14F-4D97-AF65-F5344CB8AC3E}">

</xml_diff>